<commit_message>
doc (Term): Readme update, Presentation Update
</commit_message>
<xml_diff>
--- a/GitItems/Presentation.pptx
+++ b/GitItems/Presentation.pptx
@@ -4362,7 +4362,7 @@
         <p:spPr bwMode="auto">
           <a:xfrm>
             <a:off x="609599" y="6356351"/>
-            <a:ext cx="2844799" cy="365125"/>
+            <a:ext cx="2844798" cy="365125"/>
           </a:xfrm>
           <a:prstGeom prst="rect">
             <a:avLst/>
@@ -4446,7 +4446,7 @@
         <p:spPr bwMode="auto">
           <a:xfrm>
             <a:off x="8737599" y="6356351"/>
-            <a:ext cx="2844799" cy="365125"/>
+            <a:ext cx="2844798" cy="365125"/>
           </a:xfrm>
           <a:prstGeom prst="rect">
             <a:avLst/>
@@ -4811,7 +4811,7 @@
         </p:nvSpPr>
         <p:spPr bwMode="auto">
           <a:xfrm>
-            <a:off x="914400" y="249240"/>
+            <a:off x="914400" y="249239"/>
             <a:ext cx="10363199" cy="1470025"/>
           </a:xfrm>
         </p:spPr>
@@ -4908,6 +4908,68 @@
                 </a:solidFill>
               </a:rPr>
               <a:t> Мрясов М.С.</a:t>
+            </a:r>
+            <a:br>
+              <a:rPr lang="ru-RU" sz="2200">
+                <a:solidFill>
+                  <a:schemeClr val="bg1"/>
+                </a:solidFill>
+              </a:rPr>
+            </a:br>
+            <a:r>
+              <a:rPr lang="ru-RU" sz="2200">
+                <a:solidFill>
+                  <a:schemeClr val="bg1"/>
+                </a:solidFill>
+              </a:rPr>
+              <a:t>Группа</a:t>
+            </a:r>
+            <a:r>
+              <a:rPr lang="en-US" sz="2200">
+                <a:solidFill>
+                  <a:schemeClr val="bg1"/>
+                </a:solidFill>
+              </a:rPr>
+              <a:t>: </a:t>
+            </a:r>
+            <a:r>
+              <a:rPr lang="ru-RU" sz="2200">
+                <a:solidFill>
+                  <a:schemeClr val="bg1"/>
+                </a:solidFill>
+              </a:rPr>
+              <a:t>ПД212</a:t>
+            </a:r>
+            <a:br>
+              <a:rPr lang="ru-RU" sz="2200">
+                <a:solidFill>
+                  <a:schemeClr val="bg1"/>
+                </a:solidFill>
+              </a:rPr>
+            </a:br>
+            <a:r>
+              <a:rPr lang="ru-RU" sz="2200">
+                <a:solidFill>
+                  <a:schemeClr val="bg1"/>
+                </a:solidFill>
+              </a:rPr>
+              <a:t>Направление</a:t>
+            </a:r>
+            <a:r>
+              <a:rPr lang="en-US" sz="2200">
+                <a:solidFill>
+                  <a:schemeClr val="bg1"/>
+                </a:solidFill>
+              </a:rPr>
+              <a:t>: </a:t>
+            </a:r>
+            <a:r>
+              <a:rPr lang="ru-RU" sz="2200">
+                <a:solidFill>
+                  <a:schemeClr val="bg1"/>
+                </a:solidFill>
+              </a:rPr>
+              <a:t>РПО</a:t>
             </a:r>
             <a:endParaRPr sz="2200">
               <a:solidFill>

</xml_diff>